<commit_message>
Detecting font size works
</commit_message>
<xml_diff>
--- a/goodPPT.pptx
+++ b/goodPPT.pptx
@@ -5,18 +5,19 @@
     <p:sldMasterId id="2147483648" r:id="rId1"/>
   </p:sldMasterIdLst>
   <p:sldIdLst>
-    <p:sldId id="256" r:id="rId7"/>
-    <p:sldId id="257" r:id="rId8"/>
-    <p:sldId id="258" r:id="rId9"/>
-    <p:sldId id="259" r:id="rId10"/>
-    <p:sldId id="260" r:id="rId11"/>
-    <p:sldId id="261" r:id="rId12"/>
-    <p:sldId id="262" r:id="rId13"/>
-    <p:sldId id="263" r:id="rId14"/>
-    <p:sldId id="264" r:id="rId15"/>
-    <p:sldId id="265" r:id="rId16"/>
+    <p:sldId id="256" r:id="rId2"/>
+    <p:sldId id="257" r:id="rId3"/>
+    <p:sldId id="267" r:id="rId4"/>
+    <p:sldId id="258" r:id="rId5"/>
+    <p:sldId id="259" r:id="rId6"/>
+    <p:sldId id="260" r:id="rId7"/>
+    <p:sldId id="261" r:id="rId8"/>
+    <p:sldId id="262" r:id="rId9"/>
+    <p:sldId id="263" r:id="rId10"/>
+    <p:sldId id="264" r:id="rId11"/>
+    <p:sldId id="265" r:id="rId12"/>
   </p:sldIdLst>
-  <p:sldSz cx="12188952" cy="6858000" type="screen4x3"/>
+  <p:sldSz cx="12188825" cy="6858000"/>
   <p:notesSz cx="6858000" cy="9144000"/>
   <p:defaultTextStyle>
     <a:defPPr>
@@ -113,6 +114,22 @@
       </a:defRPr>
     </a:lvl9pPr>
   </p:defaultTextStyle>
+  <p:extLst>
+    <p:ext uri="{EFAFB233-063F-42B5-8137-9DF3F51BA10A}">
+      <p15:sldGuideLst xmlns:p15="http://schemas.microsoft.com/office/powerpoint/2012/main">
+        <p15:guide id="1" orient="horz" pos="2160">
+          <p15:clr>
+            <a:srgbClr val="A4A3A4"/>
+          </p15:clr>
+        </p15:guide>
+        <p15:guide id="2" pos="2880">
+          <p15:clr>
+            <a:srgbClr val="A4A3A4"/>
+          </p15:clr>
+        </p15:guide>
+      </p15:sldGuideLst>
+    </p:ext>
+  </p:extLst>
 </p:presentation>
 </file>
 
@@ -154,10 +171,9 @@
           <a:lstStyle/>
           <a:p>
             <a:r>
-              <a:rPr lang="en-US" smtClean="0"/>
+              <a:rPr lang="en-US"/>
               <a:t>Click to edit Master title style</a:t>
             </a:r>
-            <a:endParaRPr lang="en-US"/>
           </a:p>
         </p:txBody>
       </p:sp>
@@ -273,10 +289,9 @@
           </a:lstStyle>
           <a:p>
             <a:r>
-              <a:rPr lang="en-US" smtClean="0"/>
+              <a:rPr lang="en-US"/>
               <a:t>Click to edit Master subtitle style</a:t>
             </a:r>
-            <a:endParaRPr lang="en-US"/>
           </a:p>
         </p:txBody>
       </p:sp>
@@ -297,7 +312,7 @@
           <a:p>
             <a:fld id="{5BCAD085-E8A6-8845-BD4E-CB4CCA059FC4}" type="datetimeFigureOut">
               <a:rPr lang="en-US" smtClean="0"/>
-              <a:t>1/27/13</a:t>
+              <a:t>10/31/25</a:t>
             </a:fld>
             <a:endParaRPr lang="en-US"/>
           </a:p>
@@ -391,10 +406,9 @@
           <a:lstStyle/>
           <a:p>
             <a:r>
-              <a:rPr lang="en-US" smtClean="0"/>
+              <a:rPr lang="en-US"/>
               <a:t>Click to edit Master title style</a:t>
             </a:r>
-            <a:endParaRPr lang="en-US"/>
           </a:p>
         </p:txBody>
       </p:sp>
@@ -415,38 +429,37 @@
           <a:p>
             <a:pPr lvl="0"/>
             <a:r>
-              <a:rPr lang="en-US" smtClean="0"/>
+              <a:rPr lang="en-US"/>
               <a:t>Click to edit Master text styles</a:t>
             </a:r>
           </a:p>
           <a:p>
             <a:pPr lvl="1"/>
             <a:r>
-              <a:rPr lang="en-US" smtClean="0"/>
+              <a:rPr lang="en-US"/>
               <a:t>Second level</a:t>
             </a:r>
           </a:p>
           <a:p>
             <a:pPr lvl="2"/>
             <a:r>
-              <a:rPr lang="en-US" smtClean="0"/>
+              <a:rPr lang="en-US"/>
               <a:t>Third level</a:t>
             </a:r>
           </a:p>
           <a:p>
             <a:pPr lvl="3"/>
             <a:r>
-              <a:rPr lang="en-US" smtClean="0"/>
+              <a:rPr lang="en-US"/>
               <a:t>Fourth level</a:t>
             </a:r>
           </a:p>
           <a:p>
             <a:pPr lvl="4"/>
             <a:r>
-              <a:rPr lang="en-US" smtClean="0"/>
+              <a:rPr lang="en-US"/>
               <a:t>Fifth level</a:t>
             </a:r>
-            <a:endParaRPr lang="en-US"/>
           </a:p>
         </p:txBody>
       </p:sp>
@@ -467,7 +480,7 @@
           <a:p>
             <a:fld id="{5BCAD085-E8A6-8845-BD4E-CB4CCA059FC4}" type="datetimeFigureOut">
               <a:rPr lang="en-US" smtClean="0"/>
-              <a:t>1/27/13</a:t>
+              <a:t>10/31/25</a:t>
             </a:fld>
             <a:endParaRPr lang="en-US"/>
           </a:p>
@@ -566,10 +579,9 @@
           <a:lstStyle/>
           <a:p>
             <a:r>
-              <a:rPr lang="en-US" smtClean="0"/>
+              <a:rPr lang="en-US"/>
               <a:t>Click to edit Master title style</a:t>
             </a:r>
-            <a:endParaRPr lang="en-US"/>
           </a:p>
         </p:txBody>
       </p:sp>
@@ -595,38 +607,37 @@
           <a:p>
             <a:pPr lvl="0"/>
             <a:r>
-              <a:rPr lang="en-US" smtClean="0"/>
+              <a:rPr lang="en-US"/>
               <a:t>Click to edit Master text styles</a:t>
             </a:r>
           </a:p>
           <a:p>
             <a:pPr lvl="1"/>
             <a:r>
-              <a:rPr lang="en-US" smtClean="0"/>
+              <a:rPr lang="en-US"/>
               <a:t>Second level</a:t>
             </a:r>
           </a:p>
           <a:p>
             <a:pPr lvl="2"/>
             <a:r>
-              <a:rPr lang="en-US" smtClean="0"/>
+              <a:rPr lang="en-US"/>
               <a:t>Third level</a:t>
             </a:r>
           </a:p>
           <a:p>
             <a:pPr lvl="3"/>
             <a:r>
-              <a:rPr lang="en-US" smtClean="0"/>
+              <a:rPr lang="en-US"/>
               <a:t>Fourth level</a:t>
             </a:r>
           </a:p>
           <a:p>
             <a:pPr lvl="4"/>
             <a:r>
-              <a:rPr lang="en-US" smtClean="0"/>
+              <a:rPr lang="en-US"/>
               <a:t>Fifth level</a:t>
             </a:r>
-            <a:endParaRPr lang="en-US"/>
           </a:p>
         </p:txBody>
       </p:sp>
@@ -647,7 +658,7 @@
           <a:p>
             <a:fld id="{5BCAD085-E8A6-8845-BD4E-CB4CCA059FC4}" type="datetimeFigureOut">
               <a:rPr lang="en-US" smtClean="0"/>
-              <a:t>1/27/13</a:t>
+              <a:t>10/31/25</a:t>
             </a:fld>
             <a:endParaRPr lang="en-US"/>
           </a:p>
@@ -741,10 +752,9 @@
           <a:lstStyle/>
           <a:p>
             <a:r>
-              <a:rPr lang="en-US" smtClean="0"/>
+              <a:rPr lang="en-US"/>
               <a:t>Click to edit Master title style</a:t>
             </a:r>
-            <a:endParaRPr lang="en-US"/>
           </a:p>
         </p:txBody>
       </p:sp>
@@ -765,38 +775,37 @@
           <a:p>
             <a:pPr lvl="0"/>
             <a:r>
-              <a:rPr lang="en-US" smtClean="0"/>
+              <a:rPr lang="en-US"/>
               <a:t>Click to edit Master text styles</a:t>
             </a:r>
           </a:p>
           <a:p>
             <a:pPr lvl="1"/>
             <a:r>
-              <a:rPr lang="en-US" smtClean="0"/>
+              <a:rPr lang="en-US"/>
               <a:t>Second level</a:t>
             </a:r>
           </a:p>
           <a:p>
             <a:pPr lvl="2"/>
             <a:r>
-              <a:rPr lang="en-US" smtClean="0"/>
+              <a:rPr lang="en-US"/>
               <a:t>Third level</a:t>
             </a:r>
           </a:p>
           <a:p>
             <a:pPr lvl="3"/>
             <a:r>
-              <a:rPr lang="en-US" smtClean="0"/>
+              <a:rPr lang="en-US"/>
               <a:t>Fourth level</a:t>
             </a:r>
           </a:p>
           <a:p>
             <a:pPr lvl="4"/>
             <a:r>
-              <a:rPr lang="en-US" smtClean="0"/>
+              <a:rPr lang="en-US"/>
               <a:t>Fifth level</a:t>
             </a:r>
-            <a:endParaRPr lang="en-US"/>
           </a:p>
         </p:txBody>
       </p:sp>
@@ -817,7 +826,7 @@
           <a:p>
             <a:fld id="{5BCAD085-E8A6-8845-BD4E-CB4CCA059FC4}" type="datetimeFigureOut">
               <a:rPr lang="en-US" smtClean="0"/>
-              <a:t>1/27/13</a:t>
+              <a:t>10/31/25</a:t>
             </a:fld>
             <a:endParaRPr lang="en-US"/>
           </a:p>
@@ -920,10 +929,9 @@
           </a:lstStyle>
           <a:p>
             <a:r>
-              <a:rPr lang="en-US" smtClean="0"/>
+              <a:rPr lang="en-US"/>
               <a:t>Click to edit Master title style</a:t>
             </a:r>
-            <a:endParaRPr lang="en-US"/>
           </a:p>
         </p:txBody>
       </p:sp>
@@ -1040,7 +1048,7 @@
           <a:p>
             <a:pPr lvl="0"/>
             <a:r>
-              <a:rPr lang="en-US" smtClean="0"/>
+              <a:rPr lang="en-US"/>
               <a:t>Click to edit Master text styles</a:t>
             </a:r>
           </a:p>
@@ -1063,7 +1071,7 @@
           <a:p>
             <a:fld id="{5BCAD085-E8A6-8845-BD4E-CB4CCA059FC4}" type="datetimeFigureOut">
               <a:rPr lang="en-US" smtClean="0"/>
-              <a:t>1/27/13</a:t>
+              <a:t>10/31/25</a:t>
             </a:fld>
             <a:endParaRPr lang="en-US"/>
           </a:p>
@@ -1157,10 +1165,9 @@
           <a:lstStyle/>
           <a:p>
             <a:r>
-              <a:rPr lang="en-US" smtClean="0"/>
+              <a:rPr lang="en-US"/>
               <a:t>Click to edit Master title style</a:t>
             </a:r>
-            <a:endParaRPr lang="en-US"/>
           </a:p>
         </p:txBody>
       </p:sp>
@@ -1214,38 +1221,37 @@
           <a:p>
             <a:pPr lvl="0"/>
             <a:r>
-              <a:rPr lang="en-US" smtClean="0"/>
+              <a:rPr lang="en-US"/>
               <a:t>Click to edit Master text styles</a:t>
             </a:r>
           </a:p>
           <a:p>
             <a:pPr lvl="1"/>
             <a:r>
-              <a:rPr lang="en-US" smtClean="0"/>
+              <a:rPr lang="en-US"/>
               <a:t>Second level</a:t>
             </a:r>
           </a:p>
           <a:p>
             <a:pPr lvl="2"/>
             <a:r>
-              <a:rPr lang="en-US" smtClean="0"/>
+              <a:rPr lang="en-US"/>
               <a:t>Third level</a:t>
             </a:r>
           </a:p>
           <a:p>
             <a:pPr lvl="3"/>
             <a:r>
-              <a:rPr lang="en-US" smtClean="0"/>
+              <a:rPr lang="en-US"/>
               <a:t>Fourth level</a:t>
             </a:r>
           </a:p>
           <a:p>
             <a:pPr lvl="4"/>
             <a:r>
-              <a:rPr lang="en-US" smtClean="0"/>
+              <a:rPr lang="en-US"/>
               <a:t>Fifth level</a:t>
             </a:r>
-            <a:endParaRPr lang="en-US"/>
           </a:p>
         </p:txBody>
       </p:sp>
@@ -1299,38 +1305,37 @@
           <a:p>
             <a:pPr lvl="0"/>
             <a:r>
-              <a:rPr lang="en-US" smtClean="0"/>
+              <a:rPr lang="en-US"/>
               <a:t>Click to edit Master text styles</a:t>
             </a:r>
           </a:p>
           <a:p>
             <a:pPr lvl="1"/>
             <a:r>
-              <a:rPr lang="en-US" smtClean="0"/>
+              <a:rPr lang="en-US"/>
               <a:t>Second level</a:t>
             </a:r>
           </a:p>
           <a:p>
             <a:pPr lvl="2"/>
             <a:r>
-              <a:rPr lang="en-US" smtClean="0"/>
+              <a:rPr lang="en-US"/>
               <a:t>Third level</a:t>
             </a:r>
           </a:p>
           <a:p>
             <a:pPr lvl="3"/>
             <a:r>
-              <a:rPr lang="en-US" smtClean="0"/>
+              <a:rPr lang="en-US"/>
               <a:t>Fourth level</a:t>
             </a:r>
           </a:p>
           <a:p>
             <a:pPr lvl="4"/>
             <a:r>
-              <a:rPr lang="en-US" smtClean="0"/>
+              <a:rPr lang="en-US"/>
               <a:t>Fifth level</a:t>
             </a:r>
-            <a:endParaRPr lang="en-US"/>
           </a:p>
         </p:txBody>
       </p:sp>
@@ -1351,7 +1356,7 @@
           <a:p>
             <a:fld id="{5BCAD085-E8A6-8845-BD4E-CB4CCA059FC4}" type="datetimeFigureOut">
               <a:rPr lang="en-US" smtClean="0"/>
-              <a:t>1/27/13</a:t>
+              <a:t>10/31/25</a:t>
             </a:fld>
             <a:endParaRPr lang="en-US"/>
           </a:p>
@@ -1449,10 +1454,9 @@
           </a:lstStyle>
           <a:p>
             <a:r>
-              <a:rPr lang="en-US" smtClean="0"/>
+              <a:rPr lang="en-US"/>
               <a:t>Click to edit Master title style</a:t>
             </a:r>
-            <a:endParaRPr lang="en-US"/>
           </a:p>
         </p:txBody>
       </p:sp>
@@ -1515,7 +1519,7 @@
           <a:p>
             <a:pPr lvl="0"/>
             <a:r>
-              <a:rPr lang="en-US" smtClean="0"/>
+              <a:rPr lang="en-US"/>
               <a:t>Click to edit Master text styles</a:t>
             </a:r>
           </a:p>
@@ -1571,38 +1575,37 @@
           <a:p>
             <a:pPr lvl="0"/>
             <a:r>
-              <a:rPr lang="en-US" smtClean="0"/>
+              <a:rPr lang="en-US"/>
               <a:t>Click to edit Master text styles</a:t>
             </a:r>
           </a:p>
           <a:p>
             <a:pPr lvl="1"/>
             <a:r>
-              <a:rPr lang="en-US" smtClean="0"/>
+              <a:rPr lang="en-US"/>
               <a:t>Second level</a:t>
             </a:r>
           </a:p>
           <a:p>
             <a:pPr lvl="2"/>
             <a:r>
-              <a:rPr lang="en-US" smtClean="0"/>
+              <a:rPr lang="en-US"/>
               <a:t>Third level</a:t>
             </a:r>
           </a:p>
           <a:p>
             <a:pPr lvl="3"/>
             <a:r>
-              <a:rPr lang="en-US" smtClean="0"/>
+              <a:rPr lang="en-US"/>
               <a:t>Fourth level</a:t>
             </a:r>
           </a:p>
           <a:p>
             <a:pPr lvl="4"/>
             <a:r>
-              <a:rPr lang="en-US" smtClean="0"/>
+              <a:rPr lang="en-US"/>
               <a:t>Fifth level</a:t>
             </a:r>
-            <a:endParaRPr lang="en-US"/>
           </a:p>
         </p:txBody>
       </p:sp>
@@ -1665,7 +1668,7 @@
           <a:p>
             <a:pPr lvl="0"/>
             <a:r>
-              <a:rPr lang="en-US" smtClean="0"/>
+              <a:rPr lang="en-US"/>
               <a:t>Click to edit Master text styles</a:t>
             </a:r>
           </a:p>
@@ -1721,38 +1724,37 @@
           <a:p>
             <a:pPr lvl="0"/>
             <a:r>
-              <a:rPr lang="en-US" smtClean="0"/>
+              <a:rPr lang="en-US"/>
               <a:t>Click to edit Master text styles</a:t>
             </a:r>
           </a:p>
           <a:p>
             <a:pPr lvl="1"/>
             <a:r>
-              <a:rPr lang="en-US" smtClean="0"/>
+              <a:rPr lang="en-US"/>
               <a:t>Second level</a:t>
             </a:r>
           </a:p>
           <a:p>
             <a:pPr lvl="2"/>
             <a:r>
-              <a:rPr lang="en-US" smtClean="0"/>
+              <a:rPr lang="en-US"/>
               <a:t>Third level</a:t>
             </a:r>
           </a:p>
           <a:p>
             <a:pPr lvl="3"/>
             <a:r>
-              <a:rPr lang="en-US" smtClean="0"/>
+              <a:rPr lang="en-US"/>
               <a:t>Fourth level</a:t>
             </a:r>
           </a:p>
           <a:p>
             <a:pPr lvl="4"/>
             <a:r>
-              <a:rPr lang="en-US" smtClean="0"/>
+              <a:rPr lang="en-US"/>
               <a:t>Fifth level</a:t>
             </a:r>
-            <a:endParaRPr lang="en-US"/>
           </a:p>
         </p:txBody>
       </p:sp>
@@ -1773,7 +1775,7 @@
           <a:p>
             <a:fld id="{5BCAD085-E8A6-8845-BD4E-CB4CCA059FC4}" type="datetimeFigureOut">
               <a:rPr lang="en-US" smtClean="0"/>
-              <a:t>1/27/13</a:t>
+              <a:t>10/31/25</a:t>
             </a:fld>
             <a:endParaRPr lang="en-US"/>
           </a:p>
@@ -1867,10 +1869,9 @@
           <a:lstStyle/>
           <a:p>
             <a:r>
-              <a:rPr lang="en-US" smtClean="0"/>
+              <a:rPr lang="en-US"/>
               <a:t>Click to edit Master title style</a:t>
             </a:r>
-            <a:endParaRPr lang="en-US"/>
           </a:p>
         </p:txBody>
       </p:sp>
@@ -1891,7 +1892,7 @@
           <a:p>
             <a:fld id="{5BCAD085-E8A6-8845-BD4E-CB4CCA059FC4}" type="datetimeFigureOut">
               <a:rPr lang="en-US" smtClean="0"/>
-              <a:t>1/27/13</a:t>
+              <a:t>10/31/25</a:t>
             </a:fld>
             <a:endParaRPr lang="en-US"/>
           </a:p>
@@ -1986,7 +1987,7 @@
           <a:p>
             <a:fld id="{5BCAD085-E8A6-8845-BD4E-CB4CCA059FC4}" type="datetimeFigureOut">
               <a:rPr lang="en-US" smtClean="0"/>
-              <a:t>1/27/13</a:t>
+              <a:t>10/31/25</a:t>
             </a:fld>
             <a:endParaRPr lang="en-US"/>
           </a:p>
@@ -2089,10 +2090,9 @@
           </a:lstStyle>
           <a:p>
             <a:r>
-              <a:rPr lang="en-US" smtClean="0"/>
+              <a:rPr lang="en-US"/>
               <a:t>Click to edit Master title style</a:t>
             </a:r>
-            <a:endParaRPr lang="en-US"/>
           </a:p>
         </p:txBody>
       </p:sp>
@@ -2146,38 +2146,37 @@
           <a:p>
             <a:pPr lvl="0"/>
             <a:r>
-              <a:rPr lang="en-US" smtClean="0"/>
+              <a:rPr lang="en-US"/>
               <a:t>Click to edit Master text styles</a:t>
             </a:r>
           </a:p>
           <a:p>
             <a:pPr lvl="1"/>
             <a:r>
-              <a:rPr lang="en-US" smtClean="0"/>
+              <a:rPr lang="en-US"/>
               <a:t>Second level</a:t>
             </a:r>
           </a:p>
           <a:p>
             <a:pPr lvl="2"/>
             <a:r>
-              <a:rPr lang="en-US" smtClean="0"/>
+              <a:rPr lang="en-US"/>
               <a:t>Third level</a:t>
             </a:r>
           </a:p>
           <a:p>
             <a:pPr lvl="3"/>
             <a:r>
-              <a:rPr lang="en-US" smtClean="0"/>
+              <a:rPr lang="en-US"/>
               <a:t>Fourth level</a:t>
             </a:r>
           </a:p>
           <a:p>
             <a:pPr lvl="4"/>
             <a:r>
-              <a:rPr lang="en-US" smtClean="0"/>
+              <a:rPr lang="en-US"/>
               <a:t>Fifth level</a:t>
             </a:r>
-            <a:endParaRPr lang="en-US"/>
           </a:p>
         </p:txBody>
       </p:sp>
@@ -2240,7 +2239,7 @@
           <a:p>
             <a:pPr lvl="0"/>
             <a:r>
-              <a:rPr lang="en-US" smtClean="0"/>
+              <a:rPr lang="en-US"/>
               <a:t>Click to edit Master text styles</a:t>
             </a:r>
           </a:p>
@@ -2263,7 +2262,7 @@
           <a:p>
             <a:fld id="{5BCAD085-E8A6-8845-BD4E-CB4CCA059FC4}" type="datetimeFigureOut">
               <a:rPr lang="en-US" smtClean="0"/>
-              <a:t>1/27/13</a:t>
+              <a:t>10/31/25</a:t>
             </a:fld>
             <a:endParaRPr lang="en-US"/>
           </a:p>
@@ -2366,10 +2365,9 @@
           </a:lstStyle>
           <a:p>
             <a:r>
-              <a:rPr lang="en-US" smtClean="0"/>
+              <a:rPr lang="en-US"/>
               <a:t>Click to edit Master title style</a:t>
             </a:r>
-            <a:endParaRPr lang="en-US"/>
           </a:p>
         </p:txBody>
       </p:sp>
@@ -2493,7 +2491,7 @@
           <a:p>
             <a:pPr lvl="0"/>
             <a:r>
-              <a:rPr lang="en-US" smtClean="0"/>
+              <a:rPr lang="en-US"/>
               <a:t>Click to edit Master text styles</a:t>
             </a:r>
           </a:p>
@@ -2516,7 +2514,7 @@
           <a:p>
             <a:fld id="{5BCAD085-E8A6-8845-BD4E-CB4CCA059FC4}" type="datetimeFigureOut">
               <a:rPr lang="en-US" smtClean="0"/>
-              <a:t>1/27/13</a:t>
+              <a:t>10/31/25</a:t>
             </a:fld>
             <a:endParaRPr lang="en-US"/>
           </a:p>
@@ -2625,10 +2623,9 @@
           <a:lstStyle/>
           <a:p>
             <a:r>
-              <a:rPr lang="en-US" smtClean="0"/>
+              <a:rPr lang="en-US"/>
               <a:t>Click to edit Master title style</a:t>
             </a:r>
-            <a:endParaRPr lang="en-US"/>
           </a:p>
         </p:txBody>
       </p:sp>
@@ -2659,38 +2656,37 @@
           <a:p>
             <a:pPr lvl="0"/>
             <a:r>
-              <a:rPr lang="en-US" smtClean="0"/>
+              <a:rPr lang="en-US"/>
               <a:t>Click to edit Master text styles</a:t>
             </a:r>
           </a:p>
           <a:p>
             <a:pPr lvl="1"/>
             <a:r>
-              <a:rPr lang="en-US" smtClean="0"/>
+              <a:rPr lang="en-US"/>
               <a:t>Second level</a:t>
             </a:r>
           </a:p>
           <a:p>
             <a:pPr lvl="2"/>
             <a:r>
-              <a:rPr lang="en-US" smtClean="0"/>
+              <a:rPr lang="en-US"/>
               <a:t>Third level</a:t>
             </a:r>
           </a:p>
           <a:p>
             <a:pPr lvl="3"/>
             <a:r>
-              <a:rPr lang="en-US" smtClean="0"/>
+              <a:rPr lang="en-US"/>
               <a:t>Fourth level</a:t>
             </a:r>
           </a:p>
           <a:p>
             <a:pPr lvl="4"/>
             <a:r>
-              <a:rPr lang="en-US" smtClean="0"/>
+              <a:rPr lang="en-US"/>
               <a:t>Fifth level</a:t>
             </a:r>
-            <a:endParaRPr lang="en-US"/>
           </a:p>
         </p:txBody>
       </p:sp>
@@ -2729,7 +2725,7 @@
           <a:p>
             <a:fld id="{5BCAD085-E8A6-8845-BD4E-CB4CCA059FC4}" type="datetimeFigureOut">
               <a:rPr lang="en-US" smtClean="0"/>
-              <a:t>1/27/13</a:t>
+              <a:t>10/31/25</a:t>
             </a:fld>
             <a:endParaRPr lang="en-US"/>
           </a:p>
@@ -3088,7 +3084,7 @@
 </file>
 
 <file path=ppt/slides/slide1.xml><?xml version="1.0" encoding="utf-8"?>
-<p:sld xmlns:a="http://schemas.openxmlformats.org/drawingml/2006/main" xmlns:p="http://schemas.openxmlformats.org/presentationml/2006/main" xmlns:r="http://schemas.openxmlformats.org/officeDocument/2006/relationships">
+<p:sld xmlns:a="http://schemas.openxmlformats.org/drawingml/2006/main" xmlns:r="http://schemas.openxmlformats.org/officeDocument/2006/relationships" xmlns:p="http://schemas.openxmlformats.org/presentationml/2006/main">
   <p:cSld>
     <p:bg>
       <p:bgPr>
@@ -3104,7 +3100,14 @@
         <p:cNvGrpSpPr/>
         <p:nvPr/>
       </p:nvGrpSpPr>
-      <p:grpSpPr/>
+      <p:grpSpPr>
+        <a:xfrm>
+          <a:off x="0" y="0"/>
+          <a:ext cx="0" cy="0"/>
+          <a:chOff x="0" y="0"/>
+          <a:chExt cx="0" cy="0"/>
+        </a:xfrm>
+      </p:grpSpPr>
       <p:sp>
         <p:nvSpPr>
           <p:cNvPr id="2" name="TextBox 1"/>
@@ -3162,7 +3165,9 @@
             <a:spAutoFit/>
           </a:bodyPr>
           <a:lstStyle/>
-          <a:p/>
+          <a:p>
+            <a:endParaRPr/>
+          </a:p>
           <a:p>
             <a:pPr algn="ctr">
               <a:defRPr sz="2800">
@@ -3187,7 +3192,7 @@
 </file>
 
 <file path=ppt/slides/slide10.xml><?xml version="1.0" encoding="utf-8"?>
-<p:sld xmlns:a="http://schemas.openxmlformats.org/drawingml/2006/main" xmlns:p="http://schemas.openxmlformats.org/presentationml/2006/main" xmlns:r="http://schemas.openxmlformats.org/officeDocument/2006/relationships">
+<p:sld xmlns:a="http://schemas.openxmlformats.org/drawingml/2006/main" xmlns:r="http://schemas.openxmlformats.org/officeDocument/2006/relationships" xmlns:p="http://schemas.openxmlformats.org/presentationml/2006/main">
   <p:cSld>
     <p:bg>
       <p:bgPr>
@@ -3203,7 +3208,14 @@
         <p:cNvGrpSpPr/>
         <p:nvPr/>
       </p:nvGrpSpPr>
-      <p:grpSpPr/>
+      <p:grpSpPr>
+        <a:xfrm>
+          <a:off x="0" y="0"/>
+          <a:ext cx="0" cy="0"/>
+          <a:chOff x="0" y="0"/>
+          <a:chExt cx="0" cy="0"/>
+        </a:xfrm>
+      </p:grpSpPr>
       <p:sp>
         <p:nvSpPr>
           <p:cNvPr id="2" name="TextBox 1"/>
@@ -3235,7 +3247,7 @@
               </a:defRPr>
             </a:pPr>
             <a:r>
-              <a:t>Thank You</a:t>
+              <a:t>Common Mistakes</a:t>
             </a:r>
           </a:p>
         </p:txBody>
@@ -3261,7 +3273,9 @@
             <a:spAutoFit/>
           </a:bodyPr>
           <a:lstStyle/>
-          <a:p/>
+          <a:p>
+            <a:endParaRPr/>
+          </a:p>
           <a:p>
             <a:pPr algn="ctr">
               <a:defRPr sz="2800">
@@ -3272,11 +3286,19 @@
               </a:defRPr>
             </a:pPr>
             <a:r>
-              <a:t>Questions?</a:t>
+              <a:t>• Too much text</a:t>
             </a:r>
             <a:br/>
             <a:r>
-              <a:t>Let's create something unforgettable.</a:t>
+              <a:t>• Inconsistent formatting</a:t>
+            </a:r>
+            <a:br/>
+            <a:r>
+              <a:t>• Poor color contrast</a:t>
+            </a:r>
+            <a:br/>
+            <a:r>
+              <a:t>• Reading from slides</a:t>
             </a:r>
           </a:p>
         </p:txBody>
@@ -3289,8 +3311,8 @@
 </p:sld>
 </file>
 
-<file path=ppt/slides/slide2.xml><?xml version="1.0" encoding="utf-8"?>
-<p:sld xmlns:a="http://schemas.openxmlformats.org/drawingml/2006/main" xmlns:p="http://schemas.openxmlformats.org/presentationml/2006/main" xmlns:r="http://schemas.openxmlformats.org/officeDocument/2006/relationships">
+<file path=ppt/slides/slide11.xml><?xml version="1.0" encoding="utf-8"?>
+<p:sld xmlns:a="http://schemas.openxmlformats.org/drawingml/2006/main" xmlns:r="http://schemas.openxmlformats.org/officeDocument/2006/relationships" xmlns:p="http://schemas.openxmlformats.org/presentationml/2006/main">
   <p:cSld>
     <p:bg>
       <p:bgPr>
@@ -3306,7 +3328,14 @@
         <p:cNvGrpSpPr/>
         <p:nvPr/>
       </p:nvGrpSpPr>
-      <p:grpSpPr/>
+      <p:grpSpPr>
+        <a:xfrm>
+          <a:off x="0" y="0"/>
+          <a:ext cx="0" cy="0"/>
+          <a:chOff x="0" y="0"/>
+          <a:chExt cx="0" cy="0"/>
+        </a:xfrm>
+      </p:grpSpPr>
       <p:sp>
         <p:nvSpPr>
           <p:cNvPr id="2" name="TextBox 1"/>
@@ -3315,8 +3344,8 @@
         </p:nvSpPr>
         <p:spPr>
           <a:xfrm>
-            <a:off x="914400" y="1828800"/>
-            <a:ext cx="10058400" cy="1828800"/>
+            <a:off x="4600924" y="1828800"/>
+            <a:ext cx="2685351" cy="630942"/>
           </a:xfrm>
           <a:prstGeom prst="rect">
             <a:avLst/>
@@ -3338,7 +3367,8 @@
               </a:defRPr>
             </a:pPr>
             <a:r>
-              <a:t>Agenda</a:t>
+              <a:rPr sz="3500" dirty="0"/>
+              <a:t>Thank You</a:t>
             </a:r>
           </a:p>
         </p:txBody>
@@ -3364,7 +3394,9 @@
             <a:spAutoFit/>
           </a:bodyPr>
           <a:lstStyle/>
-          <a:p/>
+          <a:p>
+            <a:endParaRPr/>
+          </a:p>
           <a:p>
             <a:pPr algn="ctr">
               <a:defRPr sz="2800">
@@ -3375,31 +3407,12 @@
               </a:defRPr>
             </a:pPr>
             <a:r>
-              <a:t>• Simplicity</a:t>
+              <a:t>Questions?</a:t>
             </a:r>
             <a:br/>
             <a:r>
-              <a:t>• Consistency</a:t>
-            </a:r>
-            <a:br/>
-            <a:r>
-              <a:t>• Visuals</a:t>
-            </a:r>
-            <a:br/>
-            <a:r>
-              <a:t>• Typography</a:t>
-            </a:r>
-            <a:br/>
-            <a:r>
-              <a:t>• Storytelling</a:t>
-            </a:r>
-            <a:br/>
-            <a:r>
-              <a:t>• Engagement</a:t>
-            </a:r>
-            <a:br/>
-            <a:r>
-              <a:t>• Mistakes to Avoid</a:t>
+              <a:rPr dirty="0"/>
+              <a:t>Let's create something unforgettable.</a:t>
             </a:r>
           </a:p>
         </p:txBody>
@@ -3412,8 +3425,8 @@
 </p:sld>
 </file>
 
-<file path=ppt/slides/slide3.xml><?xml version="1.0" encoding="utf-8"?>
-<p:sld xmlns:a="http://schemas.openxmlformats.org/drawingml/2006/main" xmlns:p="http://schemas.openxmlformats.org/presentationml/2006/main" xmlns:r="http://schemas.openxmlformats.org/officeDocument/2006/relationships">
+<file path=ppt/slides/slide2.xml><?xml version="1.0" encoding="utf-8"?>
+<p:sld xmlns:a="http://schemas.openxmlformats.org/drawingml/2006/main" xmlns:r="http://schemas.openxmlformats.org/officeDocument/2006/relationships" xmlns:p="http://schemas.openxmlformats.org/presentationml/2006/main">
   <p:cSld>
     <p:bg>
       <p:bgPr>
@@ -3429,7 +3442,14 @@
         <p:cNvGrpSpPr/>
         <p:nvPr/>
       </p:nvGrpSpPr>
-      <p:grpSpPr/>
+      <p:grpSpPr>
+        <a:xfrm>
+          <a:off x="0" y="0"/>
+          <a:ext cx="0" cy="0"/>
+          <a:chOff x="0" y="0"/>
+          <a:chExt cx="0" cy="0"/>
+        </a:xfrm>
+      </p:grpSpPr>
       <p:sp>
         <p:nvSpPr>
           <p:cNvPr id="2" name="TextBox 1"/>
@@ -3461,7 +3481,8 @@
               </a:defRPr>
             </a:pPr>
             <a:r>
-              <a:t>Simplicity</a:t>
+              <a:rPr dirty="0"/>
+              <a:t>Agenda</a:t>
             </a:r>
           </a:p>
         </p:txBody>
@@ -3487,7 +3508,9 @@
             <a:spAutoFit/>
           </a:bodyPr>
           <a:lstStyle/>
-          <a:p/>
+          <a:p>
+            <a:endParaRPr/>
+          </a:p>
           <a:p>
             <a:pPr algn="ctr">
               <a:defRPr sz="2800">
@@ -3498,11 +3521,31 @@
               </a:defRPr>
             </a:pPr>
             <a:r>
-              <a:t>Great presentations focus on one idea per slide.</a:t>
+              <a:t>• Simplicity</a:t>
             </a:r>
             <a:br/>
             <a:r>
-              <a:t>Less clutter. More clarity.</a:t>
+              <a:t>• Consistency</a:t>
+            </a:r>
+            <a:br/>
+            <a:r>
+              <a:t>• Visuals</a:t>
+            </a:r>
+            <a:br/>
+            <a:r>
+              <a:t>• Typography</a:t>
+            </a:r>
+            <a:br/>
+            <a:r>
+              <a:t>• Storytelling</a:t>
+            </a:r>
+            <a:br/>
+            <a:r>
+              <a:t>• Engagement</a:t>
+            </a:r>
+            <a:br/>
+            <a:r>
+              <a:t>• Mistakes to Avoid</a:t>
             </a:r>
           </a:p>
         </p:txBody>
@@ -3515,8 +3558,94 @@
 </p:sld>
 </file>
 
+<file path=ppt/slides/slide3.xml><?xml version="1.0" encoding="utf-8"?>
+<p:sld xmlns:a="http://schemas.openxmlformats.org/drawingml/2006/main" xmlns:r="http://schemas.openxmlformats.org/officeDocument/2006/relationships" xmlns:p="http://schemas.openxmlformats.org/presentationml/2006/main">
+  <p:cSld>
+    <p:spTree>
+      <p:nvGrpSpPr>
+        <p:cNvPr id="1" name=""/>
+        <p:cNvGrpSpPr/>
+        <p:nvPr/>
+      </p:nvGrpSpPr>
+      <p:grpSpPr>
+        <a:xfrm>
+          <a:off x="0" y="0"/>
+          <a:ext cx="0" cy="0"/>
+          <a:chOff x="0" y="0"/>
+          <a:chExt cx="0" cy="0"/>
+        </a:xfrm>
+      </p:grpSpPr>
+      <p:sp>
+        <p:nvSpPr>
+          <p:cNvPr id="2" name="Title 1">
+            <a:extLst>
+              <a:ext uri="{FF2B5EF4-FFF2-40B4-BE49-F238E27FC236}">
+                <a16:creationId xmlns:a16="http://schemas.microsoft.com/office/drawing/2014/main" id="{DA18EA80-4FCF-B6F0-0D42-BBD203063758}"/>
+              </a:ext>
+            </a:extLst>
+          </p:cNvPr>
+          <p:cNvSpPr>
+            <a:spLocks noGrp="1"/>
+          </p:cNvSpPr>
+          <p:nvPr>
+            <p:ph type="title"/>
+          </p:nvPr>
+        </p:nvSpPr>
+        <p:spPr/>
+        <p:txBody>
+          <a:bodyPr/>
+          <a:lstStyle/>
+          <a:p>
+            <a:r>
+              <a:rPr lang="en-US" dirty="0"/>
+              <a:t>Hello</a:t>
+            </a:r>
+          </a:p>
+        </p:txBody>
+      </p:sp>
+      <p:sp>
+        <p:nvSpPr>
+          <p:cNvPr id="3" name="Content Placeholder 2">
+            <a:extLst>
+              <a:ext uri="{FF2B5EF4-FFF2-40B4-BE49-F238E27FC236}">
+                <a16:creationId xmlns:a16="http://schemas.microsoft.com/office/drawing/2014/main" id="{A0E9A234-15E4-7334-A16A-FD9C6CF414AC}"/>
+              </a:ext>
+            </a:extLst>
+          </p:cNvPr>
+          <p:cNvSpPr>
+            <a:spLocks noGrp="1"/>
+          </p:cNvSpPr>
+          <p:nvPr>
+            <p:ph idx="1"/>
+          </p:nvPr>
+        </p:nvSpPr>
+        <p:spPr/>
+        <p:txBody>
+          <a:bodyPr/>
+          <a:lstStyle/>
+          <a:p>
+            <a:r>
+              <a:rPr lang="en-US" dirty="0"/>
+              <a:t>Bob</a:t>
+            </a:r>
+          </a:p>
+        </p:txBody>
+      </p:sp>
+    </p:spTree>
+    <p:extLst>
+      <p:ext uri="{BB962C8B-B14F-4D97-AF65-F5344CB8AC3E}">
+        <p14:creationId xmlns:p14="http://schemas.microsoft.com/office/powerpoint/2010/main" val="471648870"/>
+      </p:ext>
+    </p:extLst>
+  </p:cSld>
+  <p:clrMapOvr>
+    <a:masterClrMapping/>
+  </p:clrMapOvr>
+</p:sld>
+</file>
+
 <file path=ppt/slides/slide4.xml><?xml version="1.0" encoding="utf-8"?>
-<p:sld xmlns:a="http://schemas.openxmlformats.org/drawingml/2006/main" xmlns:p="http://schemas.openxmlformats.org/presentationml/2006/main" xmlns:r="http://schemas.openxmlformats.org/officeDocument/2006/relationships">
+<p:sld xmlns:a="http://schemas.openxmlformats.org/drawingml/2006/main" xmlns:r="http://schemas.openxmlformats.org/officeDocument/2006/relationships" xmlns:p="http://schemas.openxmlformats.org/presentationml/2006/main">
   <p:cSld>
     <p:bg>
       <p:bgPr>
@@ -3532,7 +3661,14 @@
         <p:cNvGrpSpPr/>
         <p:nvPr/>
       </p:nvGrpSpPr>
-      <p:grpSpPr/>
+      <p:grpSpPr>
+        <a:xfrm>
+          <a:off x="0" y="0"/>
+          <a:ext cx="0" cy="0"/>
+          <a:chOff x="0" y="0"/>
+          <a:chExt cx="0" cy="0"/>
+        </a:xfrm>
+      </p:grpSpPr>
       <p:sp>
         <p:nvSpPr>
           <p:cNvPr id="2" name="TextBox 1"/>
@@ -3564,7 +3700,8 @@
               </a:defRPr>
             </a:pPr>
             <a:r>
-              <a:t>Consistency</a:t>
+              <a:rPr dirty="0"/>
+              <a:t>Simplicity</a:t>
             </a:r>
           </a:p>
         </p:txBody>
@@ -3590,7 +3727,9 @@
             <a:spAutoFit/>
           </a:bodyPr>
           <a:lstStyle/>
-          <a:p/>
+          <a:p>
+            <a:endParaRPr/>
+          </a:p>
           <a:p>
             <a:pPr algn="ctr">
               <a:defRPr sz="2800">
@@ -3601,11 +3740,11 @@
               </a:defRPr>
             </a:pPr>
             <a:r>
-              <a:t>Keep your design elements uniform:</a:t>
+              <a:t>Great presentations focus on one idea per slide.</a:t>
             </a:r>
             <a:br/>
             <a:r>
-              <a:t>Colors, fonts, and spacing build trust and rhythm.</a:t>
+              <a:t>Less clutter. More clarity.</a:t>
             </a:r>
           </a:p>
         </p:txBody>
@@ -3619,7 +3758,7 @@
 </file>
 
 <file path=ppt/slides/slide5.xml><?xml version="1.0" encoding="utf-8"?>
-<p:sld xmlns:a="http://schemas.openxmlformats.org/drawingml/2006/main" xmlns:p="http://schemas.openxmlformats.org/presentationml/2006/main" xmlns:r="http://schemas.openxmlformats.org/officeDocument/2006/relationships">
+<p:sld xmlns:a="http://schemas.openxmlformats.org/drawingml/2006/main" xmlns:r="http://schemas.openxmlformats.org/officeDocument/2006/relationships" xmlns:p="http://schemas.openxmlformats.org/presentationml/2006/main">
   <p:cSld>
     <p:bg>
       <p:bgPr>
@@ -3635,7 +3774,14 @@
         <p:cNvGrpSpPr/>
         <p:nvPr/>
       </p:nvGrpSpPr>
-      <p:grpSpPr/>
+      <p:grpSpPr>
+        <a:xfrm>
+          <a:off x="0" y="0"/>
+          <a:ext cx="0" cy="0"/>
+          <a:chOff x="0" y="0"/>
+          <a:chExt cx="0" cy="0"/>
+        </a:xfrm>
+      </p:grpSpPr>
       <p:sp>
         <p:nvSpPr>
           <p:cNvPr id="2" name="TextBox 1"/>
@@ -3667,7 +3813,7 @@
               </a:defRPr>
             </a:pPr>
             <a:r>
-              <a:t>Visuals</a:t>
+              <a:t>Consistency</a:t>
             </a:r>
           </a:p>
         </p:txBody>
@@ -3693,7 +3839,9 @@
             <a:spAutoFit/>
           </a:bodyPr>
           <a:lstStyle/>
-          <a:p/>
+          <a:p>
+            <a:endParaRPr/>
+          </a:p>
           <a:p>
             <a:pPr algn="ctr">
               <a:defRPr sz="2800">
@@ -3704,11 +3852,11 @@
               </a:defRPr>
             </a:pPr>
             <a:r>
-              <a:t>Images speak louder than text.</a:t>
+              <a:t>Keep your design elements uniform:</a:t>
             </a:r>
             <a:br/>
             <a:r>
-              <a:t>Use relevant visuals and whitespace to emphasize key ideas.</a:t>
+              <a:t>Colors, fonts, and spacing build trust and rhythm.</a:t>
             </a:r>
           </a:p>
         </p:txBody>
@@ -3722,7 +3870,7 @@
 </file>
 
 <file path=ppt/slides/slide6.xml><?xml version="1.0" encoding="utf-8"?>
-<p:sld xmlns:a="http://schemas.openxmlformats.org/drawingml/2006/main" xmlns:p="http://schemas.openxmlformats.org/presentationml/2006/main" xmlns:r="http://schemas.openxmlformats.org/officeDocument/2006/relationships">
+<p:sld xmlns:a="http://schemas.openxmlformats.org/drawingml/2006/main" xmlns:r="http://schemas.openxmlformats.org/officeDocument/2006/relationships" xmlns:p="http://schemas.openxmlformats.org/presentationml/2006/main">
   <p:cSld>
     <p:bg>
       <p:bgPr>
@@ -3738,7 +3886,14 @@
         <p:cNvGrpSpPr/>
         <p:nvPr/>
       </p:nvGrpSpPr>
-      <p:grpSpPr/>
+      <p:grpSpPr>
+        <a:xfrm>
+          <a:off x="0" y="0"/>
+          <a:ext cx="0" cy="0"/>
+          <a:chOff x="0" y="0"/>
+          <a:chExt cx="0" cy="0"/>
+        </a:xfrm>
+      </p:grpSpPr>
       <p:sp>
         <p:nvSpPr>
           <p:cNvPr id="2" name="TextBox 1"/>
@@ -3770,7 +3925,7 @@
               </a:defRPr>
             </a:pPr>
             <a:r>
-              <a:t>Typography</a:t>
+              <a:t>Visuals</a:t>
             </a:r>
           </a:p>
         </p:txBody>
@@ -3796,7 +3951,9 @@
             <a:spAutoFit/>
           </a:bodyPr>
           <a:lstStyle/>
-          <a:p/>
+          <a:p>
+            <a:endParaRPr/>
+          </a:p>
           <a:p>
             <a:pPr algn="ctr">
               <a:defRPr sz="2800">
@@ -3807,11 +3964,11 @@
               </a:defRPr>
             </a:pPr>
             <a:r>
-              <a:t>Font choice sets the tone.</a:t>
+              <a:t>Images speak louder than text.</a:t>
             </a:r>
             <a:br/>
             <a:r>
-              <a:t>Use contrast and hierarchy to guide the viewer's eye.</a:t>
+              <a:t>Use relevant visuals and whitespace to emphasize key ideas.</a:t>
             </a:r>
           </a:p>
         </p:txBody>
@@ -3825,7 +3982,7 @@
 </file>
 
 <file path=ppt/slides/slide7.xml><?xml version="1.0" encoding="utf-8"?>
-<p:sld xmlns:a="http://schemas.openxmlformats.org/drawingml/2006/main" xmlns:p="http://schemas.openxmlformats.org/presentationml/2006/main" xmlns:r="http://schemas.openxmlformats.org/officeDocument/2006/relationships">
+<p:sld xmlns:a="http://schemas.openxmlformats.org/drawingml/2006/main" xmlns:r="http://schemas.openxmlformats.org/officeDocument/2006/relationships" xmlns:p="http://schemas.openxmlformats.org/presentationml/2006/main">
   <p:cSld>
     <p:bg>
       <p:bgPr>
@@ -3841,7 +3998,14 @@
         <p:cNvGrpSpPr/>
         <p:nvPr/>
       </p:nvGrpSpPr>
-      <p:grpSpPr/>
+      <p:grpSpPr>
+        <a:xfrm>
+          <a:off x="0" y="0"/>
+          <a:ext cx="0" cy="0"/>
+          <a:chOff x="0" y="0"/>
+          <a:chExt cx="0" cy="0"/>
+        </a:xfrm>
+      </p:grpSpPr>
       <p:sp>
         <p:nvSpPr>
           <p:cNvPr id="2" name="TextBox 1"/>
@@ -3873,7 +4037,7 @@
               </a:defRPr>
             </a:pPr>
             <a:r>
-              <a:t>Storytelling</a:t>
+              <a:t>Typography</a:t>
             </a:r>
           </a:p>
         </p:txBody>
@@ -3899,7 +4063,9 @@
             <a:spAutoFit/>
           </a:bodyPr>
           <a:lstStyle/>
-          <a:p/>
+          <a:p>
+            <a:endParaRPr/>
+          </a:p>
           <a:p>
             <a:pPr algn="ctr">
               <a:defRPr sz="2800">
@@ -3910,11 +4076,11 @@
               </a:defRPr>
             </a:pPr>
             <a:r>
-              <a:t>Every presentation is a story.</a:t>
+              <a:t>Font choice sets the tone.</a:t>
             </a:r>
             <a:br/>
             <a:r>
-              <a:t>Hook your audience, build tension, and deliver insight.</a:t>
+              <a:t>Use contrast and hierarchy to guide the viewer's eye.</a:t>
             </a:r>
           </a:p>
         </p:txBody>
@@ -3928,7 +4094,7 @@
 </file>
 
 <file path=ppt/slides/slide8.xml><?xml version="1.0" encoding="utf-8"?>
-<p:sld xmlns:a="http://schemas.openxmlformats.org/drawingml/2006/main" xmlns:p="http://schemas.openxmlformats.org/presentationml/2006/main" xmlns:r="http://schemas.openxmlformats.org/officeDocument/2006/relationships">
+<p:sld xmlns:a="http://schemas.openxmlformats.org/drawingml/2006/main" xmlns:r="http://schemas.openxmlformats.org/officeDocument/2006/relationships" xmlns:p="http://schemas.openxmlformats.org/presentationml/2006/main">
   <p:cSld>
     <p:bg>
       <p:bgPr>
@@ -3944,7 +4110,14 @@
         <p:cNvGrpSpPr/>
         <p:nvPr/>
       </p:nvGrpSpPr>
-      <p:grpSpPr/>
+      <p:grpSpPr>
+        <a:xfrm>
+          <a:off x="0" y="0"/>
+          <a:ext cx="0" cy="0"/>
+          <a:chOff x="0" y="0"/>
+          <a:chExt cx="0" cy="0"/>
+        </a:xfrm>
+      </p:grpSpPr>
       <p:sp>
         <p:nvSpPr>
           <p:cNvPr id="2" name="TextBox 1"/>
@@ -3976,7 +4149,7 @@
               </a:defRPr>
             </a:pPr>
             <a:r>
-              <a:t>Engagement</a:t>
+              <a:t>Storytelling</a:t>
             </a:r>
           </a:p>
         </p:txBody>
@@ -4002,7 +4175,9 @@
             <a:spAutoFit/>
           </a:bodyPr>
           <a:lstStyle/>
-          <a:p/>
+          <a:p>
+            <a:endParaRPr/>
+          </a:p>
           <a:p>
             <a:pPr algn="ctr">
               <a:defRPr sz="2800">
@@ -4013,11 +4188,11 @@
               </a:defRPr>
             </a:pPr>
             <a:r>
-              <a:t>Ask questions, show data visually, and maintain eye contact.</a:t>
+              <a:t>Every presentation is a story.</a:t>
             </a:r>
             <a:br/>
             <a:r>
-              <a:t>Interaction breeds retention.</a:t>
+              <a:t>Hook your audience, build tension, and deliver insight.</a:t>
             </a:r>
           </a:p>
         </p:txBody>
@@ -4031,7 +4206,7 @@
 </file>
 
 <file path=ppt/slides/slide9.xml><?xml version="1.0" encoding="utf-8"?>
-<p:sld xmlns:a="http://schemas.openxmlformats.org/drawingml/2006/main" xmlns:p="http://schemas.openxmlformats.org/presentationml/2006/main" xmlns:r="http://schemas.openxmlformats.org/officeDocument/2006/relationships">
+<p:sld xmlns:a="http://schemas.openxmlformats.org/drawingml/2006/main" xmlns:r="http://schemas.openxmlformats.org/officeDocument/2006/relationships" xmlns:p="http://schemas.openxmlformats.org/presentationml/2006/main">
   <p:cSld>
     <p:bg>
       <p:bgPr>
@@ -4047,7 +4222,14 @@
         <p:cNvGrpSpPr/>
         <p:nvPr/>
       </p:nvGrpSpPr>
-      <p:grpSpPr/>
+      <p:grpSpPr>
+        <a:xfrm>
+          <a:off x="0" y="0"/>
+          <a:ext cx="0" cy="0"/>
+          <a:chOff x="0" y="0"/>
+          <a:chExt cx="0" cy="0"/>
+        </a:xfrm>
+      </p:grpSpPr>
       <p:sp>
         <p:nvSpPr>
           <p:cNvPr id="2" name="TextBox 1"/>
@@ -4079,7 +4261,7 @@
               </a:defRPr>
             </a:pPr>
             <a:r>
-              <a:t>Common Mistakes</a:t>
+              <a:t>Engagement</a:t>
             </a:r>
           </a:p>
         </p:txBody>
@@ -4105,7 +4287,9 @@
             <a:spAutoFit/>
           </a:bodyPr>
           <a:lstStyle/>
-          <a:p/>
+          <a:p>
+            <a:endParaRPr/>
+          </a:p>
           <a:p>
             <a:pPr algn="ctr">
               <a:defRPr sz="2800">
@@ -4116,19 +4300,11 @@
               </a:defRPr>
             </a:pPr>
             <a:r>
-              <a:t>• Too much text</a:t>
+              <a:t>Ask questions, show data visually, and maintain eye contact.</a:t>
             </a:r>
             <a:br/>
             <a:r>
-              <a:t>• Inconsistent formatting</a:t>
-            </a:r>
-            <a:br/>
-            <a:r>
-              <a:t>• Poor color contrast</a:t>
-            </a:r>
-            <a:br/>
-            <a:r>
-              <a:t>• Reading from slides</a:t>
+              <a:t>Interaction breeds retention.</a:t>
             </a:r>
           </a:p>
         </p:txBody>

</xml_diff>